<commit_message>
forward and backward subset slide
</commit_message>
<xml_diff>
--- a/Presentation/HopeSlides.pptx
+++ b/Presentation/HopeSlides.pptx
@@ -8,6 +8,7 @@
     <p:sldId id="256" r:id="rId2"/>
     <p:sldId id="257" r:id="rId3"/>
     <p:sldId id="258" r:id="rId4"/>
+    <p:sldId id="259" r:id="rId5"/>
   </p:sldIdLst>
   <p:sldSz cx="9144000" cy="5143500" type="screen16x9"/>
   <p:notesSz cx="6858000" cy="9144000"/>
@@ -3633,6 +3634,675 @@
           </a:graphicData>
         </a:graphic>
       </p:graphicFrame>
+    </p:spTree>
+  </p:cSld>
+</p:sld>
+</file>
+
+<file path=ppt/slides/slide4.xml><?xml version="1.0" encoding="utf-8"?>
+<p:sld xmlns:a="http://schemas.openxmlformats.org/drawingml/2006/main" xmlns:r="http://schemas.openxmlformats.org/officeDocument/2006/relationships" xmlns:p="http://schemas.openxmlformats.org/presentationml/2006/main">
+  <p:cSld>
+    <p:spTree>
+      <p:nvGrpSpPr>
+        <p:cNvPr id="1" name=""/>
+        <p:cNvGrpSpPr/>
+        <p:nvPr/>
+      </p:nvGrpSpPr>
+      <p:grpSpPr>
+        <a:xfrm>
+          <a:off x="0" y="0"/>
+          <a:ext cx="0" cy="0"/>
+          <a:chOff x="0" y="0"/>
+          <a:chExt cx="0" cy="0"/>
+        </a:xfrm>
+      </p:grpSpPr>
+      <p:sp>
+        <p:nvSpPr>
+          <p:cNvPr id="2" name="Title 1"/>
+          <p:cNvSpPr>
+            <a:spLocks noGrp="1"/>
+          </p:cNvSpPr>
+          <p:nvPr>
+            <p:ph type="title"/>
+          </p:nvPr>
+        </p:nvSpPr>
+        <p:spPr/>
+        <p:txBody>
+          <a:bodyPr/>
+          <a:lstStyle/>
+          <a:p>
+            <a:pPr lvl="0" indent="0" marL="0">
+              <a:buNone/>
+            </a:pPr>
+            <a:r>
+              <a:rPr/>
+              <a:t>Forward and Backward Subset</a:t>
+            </a:r>
+          </a:p>
+        </p:txBody>
+      </p:sp>
+      <p:graphicFrame>
+        <p:nvGraphicFramePr>
+          <p:cNvPr id="6" name="Content Placeholder 5"/>
+          <p:cNvGraphicFramePr>
+            <a:graphicFrameLocks noGrp="1"/>
+          </p:cNvGraphicFramePr>
+          <p:nvPr>
+            <p:ph idx="1"/>
+          </p:nvPr>
+        </p:nvGraphicFramePr>
+        <p:xfrm>
+          <a:off x="457200" y="1193800"/>
+          <a:ext cx="4038600" cy="3390900"/>
+        </p:xfrm>
+        <a:graphic>
+          <a:graphicData uri="http://schemas.openxmlformats.org/drawingml/2006/table">
+            <a:tbl>
+              <a:tblPr firstRow="1" bandRow="1">
+                <a:tableStyleId>{5C22544A-7EE6-4342-B048-85BDC9FD1C3A}</a:tableStyleId>
+              </a:tblPr>
+              <a:tblGrid>
+                <a:gridCol w="1003300"/>
+                <a:gridCol w="1003300"/>
+                <a:gridCol w="1003300"/>
+                <a:gridCol w="1003300"/>
+              </a:tblGrid>
+              <a:tr h="0">
+                <a:tc>
+                  <a:txBody>
+                    <a:bodyPr/>
+                    <a:lstStyle/>
+                    <a:p>
+                      <a:pPr lvl="0" indent="0" marL="0" algn="r">
+                        <a:buNone/>
+                      </a:pPr>
+                      <a:r>
+                        <a:rPr/>
+                        <a:t>step</a:t>
+                      </a:r>
+                    </a:p>
+                  </a:txBody>
+                  <a:tcPr/>
+                </a:tc>
+                <a:tc>
+                  <a:txBody>
+                    <a:bodyPr/>
+                    <a:lstStyle/>
+                    <a:p>
+                      <a:pPr lvl="0" indent="0" marL="0" algn="l">
+                        <a:buNone/>
+                      </a:pPr>
+                      <a:r>
+                        <a:rPr/>
+                        <a:t>variable</a:t>
+                      </a:r>
+                    </a:p>
+                  </a:txBody>
+                  <a:tcPr/>
+                </a:tc>
+                <a:tc>
+                  <a:txBody>
+                    <a:bodyPr/>
+                    <a:lstStyle/>
+                    <a:p>
+                      <a:pPr lvl="0" indent="0" marL="0" algn="r">
+                        <a:buNone/>
+                      </a:pPr>
+                      <a:r>
+                        <a:rPr/>
+                        <a:t>step (cont)</a:t>
+                      </a:r>
+                    </a:p>
+                  </a:txBody>
+                  <a:tcPr/>
+                </a:tc>
+                <a:tc>
+                  <a:txBody>
+                    <a:bodyPr/>
+                    <a:lstStyle/>
+                    <a:p>
+                      <a:pPr lvl="0" indent="0" marL="0" algn="l">
+                        <a:buNone/>
+                      </a:pPr>
+                      <a:r>
+                        <a:rPr/>
+                        <a:t>variable (cont)</a:t>
+                      </a:r>
+                    </a:p>
+                  </a:txBody>
+                  <a:tcPr/>
+                </a:tc>
+              </a:tr>
+              <a:tr h="0">
+                <a:tc>
+                  <a:txBody>
+                    <a:bodyPr/>
+                    <a:lstStyle/>
+                    <a:p>
+                      <a:pPr lvl="0" indent="0" marL="0" algn="r">
+                        <a:buNone/>
+                      </a:pPr>
+                      <a:r>
+                        <a:rPr/>
+                        <a:t>1</a:t>
+                      </a:r>
+                    </a:p>
+                  </a:txBody>
+                </a:tc>
+                <a:tc>
+                  <a:txBody>
+                    <a:bodyPr/>
+                    <a:lstStyle/>
+                    <a:p>
+                      <a:pPr lvl="0" indent="0" marL="0" algn="l">
+                        <a:buNone/>
+                      </a:pPr>
+                      <a:r>
+                        <a:rPr/>
+                        <a:t>year_adm</a:t>
+                      </a:r>
+                    </a:p>
+                  </a:txBody>
+                </a:tc>
+                <a:tc>
+                  <a:txBody>
+                    <a:bodyPr/>
+                    <a:lstStyle/>
+                    <a:p>
+                      <a:pPr lvl="0" indent="0" marL="0" algn="r">
+                        <a:buNone/>
+                      </a:pPr>
+                      <a:r>
+                        <a:rPr/>
+                        <a:t>9</a:t>
+                      </a:r>
+                    </a:p>
+                  </a:txBody>
+                </a:tc>
+                <a:tc>
+                  <a:txBody>
+                    <a:bodyPr/>
+                    <a:lstStyle/>
+                    <a:p>
+                      <a:pPr lvl="0" indent="0" marL="0" algn="l">
+                        <a:buNone/>
+                      </a:pPr>
+                      <a:r>
+                        <a:rPr/>
+                        <a:t>armed</a:t>
+                      </a:r>
+                    </a:p>
+                  </a:txBody>
+                </a:tc>
+              </a:tr>
+              <a:tr h="0">
+                <a:tc>
+                  <a:txBody>
+                    <a:bodyPr/>
+                    <a:lstStyle/>
+                    <a:p>
+                      <a:pPr lvl="0" indent="0" marL="0" algn="r">
+                        <a:buNone/>
+                      </a:pPr>
+                      <a:r>
+                        <a:rPr/>
+                        <a:t>2</a:t>
+                      </a:r>
+                    </a:p>
+                  </a:txBody>
+                </a:tc>
+                <a:tc>
+                  <a:txBody>
+                    <a:bodyPr/>
+                    <a:lstStyle/>
+                    <a:p>
+                      <a:pPr lvl="0" indent="0" marL="0" algn="l">
+                        <a:buNone/>
+                      </a:pPr>
+                      <a:r>
+                        <a:rPr/>
+                        <a:t>class</a:t>
+                      </a:r>
+                    </a:p>
+                  </a:txBody>
+                </a:tc>
+                <a:tc>
+                  <a:txBody>
+                    <a:bodyPr/>
+                    <a:lstStyle/>
+                    <a:p>
+                      <a:pPr lvl="0" indent="0" marL="0" algn="r">
+                        <a:buNone/>
+                      </a:pPr>
+                      <a:r>
+                        <a:rPr/>
+                        <a:t>10</a:t>
+                      </a:r>
+                    </a:p>
+                  </a:txBody>
+                </a:tc>
+                <a:tc>
+                  <a:txBody>
+                    <a:bodyPr/>
+                    <a:lstStyle/>
+                    <a:p>
+                      <a:pPr lvl="0" indent="0" marL="0" algn="l">
+                        <a:buNone/>
+                      </a:pPr>
+                      <a:r>
+                        <a:rPr/>
+                        <a:t>attempted</a:t>
+                      </a:r>
+                    </a:p>
+                  </a:txBody>
+                </a:tc>
+              </a:tr>
+              <a:tr h="0">
+                <a:tc>
+                  <a:txBody>
+                    <a:bodyPr/>
+                    <a:lstStyle/>
+                    <a:p>
+                      <a:pPr lvl="0" indent="0" marL="0" algn="r">
+                        <a:buNone/>
+                      </a:pPr>
+                      <a:r>
+                        <a:rPr/>
+                        <a:t>3</a:t>
+                      </a:r>
+                    </a:p>
+                  </a:txBody>
+                </a:tc>
+                <a:tc>
+                  <a:txBody>
+                    <a:bodyPr/>
+                    <a:lstStyle/>
+                    <a:p>
+                      <a:pPr lvl="0" indent="0" marL="0" algn="l">
+                        <a:buNone/>
+                      </a:pPr>
+                      <a:r>
+                        <a:rPr/>
+                        <a:t>parent_institution</a:t>
+                      </a:r>
+                    </a:p>
+                  </a:txBody>
+                </a:tc>
+                <a:tc>
+                  <a:txBody>
+                    <a:bodyPr/>
+                    <a:lstStyle/>
+                    <a:p>
+                      <a:pPr lvl="0" indent="0" marL="0" algn="r">
+                        <a:buNone/>
+                      </a:pPr>
+                      <a:r>
+                        <a:rPr/>
+                        <a:t>11</a:t>
+                      </a:r>
+                    </a:p>
+                  </a:txBody>
+                </a:tc>
+                <a:tc>
+                  <a:txBody>
+                    <a:bodyPr/>
+                    <a:lstStyle/>
+                    <a:p>
+                      <a:pPr lvl="0" indent="0" marL="0" algn="l">
+                        <a:buNone/>
+                      </a:pPr>
+                      <a:r>
+                        <a:rPr/>
+                        <a:t>race</a:t>
+                      </a:r>
+                    </a:p>
+                  </a:txBody>
+                </a:tc>
+              </a:tr>
+              <a:tr h="0">
+                <a:tc>
+                  <a:txBody>
+                    <a:bodyPr/>
+                    <a:lstStyle/>
+                    <a:p>
+                      <a:pPr lvl="0" indent="0" marL="0" algn="r">
+                        <a:buNone/>
+                      </a:pPr>
+                      <a:r>
+                        <a:rPr/>
+                        <a:t>4</a:t>
+                      </a:r>
+                    </a:p>
+                  </a:txBody>
+                </a:tc>
+                <a:tc>
+                  <a:txBody>
+                    <a:bodyPr/>
+                    <a:lstStyle/>
+                    <a:p>
+                      <a:pPr lvl="0" indent="0" marL="0" algn="l">
+                        <a:buNone/>
+                      </a:pPr>
+                      <a:r>
+                        <a:rPr/>
+                        <a:t>total_counts</a:t>
+                      </a:r>
+                    </a:p>
+                  </a:txBody>
+                </a:tc>
+                <a:tc>
+                  <a:txBody>
+                    <a:bodyPr/>
+                    <a:lstStyle/>
+                    <a:p>
+                      <a:pPr lvl="0" indent="0" marL="0" algn="r">
+                        <a:buNone/>
+                      </a:pPr>
+                      <a:r>
+                        <a:rPr/>
+                        <a:t>12</a:t>
+                      </a:r>
+                    </a:p>
+                  </a:txBody>
+                </a:tc>
+                <a:tc>
+                  <a:txBody>
+                    <a:bodyPr/>
+                    <a:lstStyle/>
+                    <a:p>
+                      <a:pPr lvl="0" indent="0" marL="0" algn="l">
+                        <a:buNone/>
+                      </a:pPr>
+                      <a:r>
+                        <a:rPr/>
+                        <a:t>weight</a:t>
+                      </a:r>
+                    </a:p>
+                  </a:txBody>
+                </a:tc>
+              </a:tr>
+              <a:tr h="0">
+                <a:tc>
+                  <a:txBody>
+                    <a:bodyPr/>
+                    <a:lstStyle/>
+                    <a:p>
+                      <a:pPr lvl="0" indent="0" marL="0" algn="r">
+                        <a:buNone/>
+                      </a:pPr>
+                      <a:r>
+                        <a:rPr/>
+                        <a:t>5</a:t>
+                      </a:r>
+                    </a:p>
+                  </a:txBody>
+                </a:tc>
+                <a:tc>
+                  <a:txBody>
+                    <a:bodyPr/>
+                    <a:lstStyle/>
+                    <a:p>
+                      <a:pPr lvl="0" indent="0" marL="0" algn="l">
+                        <a:buNone/>
+                      </a:pPr>
+                      <a:r>
+                        <a:rPr/>
+                        <a:t>offense_category</a:t>
+                      </a:r>
+                    </a:p>
+                  </a:txBody>
+                </a:tc>
+                <a:tc>
+                  <a:txBody>
+                    <a:bodyPr/>
+                    <a:lstStyle/>
+                    <a:p>
+                      <a:pPr lvl="0" indent="0" marL="0" algn="r">
+                        <a:buNone/>
+                      </a:pPr>
+                      <a:r>
+                        <a:rPr/>
+                        <a:t>13</a:t>
+                      </a:r>
+                    </a:p>
+                  </a:txBody>
+                </a:tc>
+                <a:tc>
+                  <a:txBody>
+                    <a:bodyPr/>
+                    <a:lstStyle/>
+                    <a:p>
+                      <a:pPr lvl="0" indent="0" marL="0" algn="l">
+                        <a:buNone/>
+                      </a:pPr>
+                      <a:r>
+                        <a:rPr/>
+                        <a:t>month_adm</a:t>
+                      </a:r>
+                    </a:p>
+                  </a:txBody>
+                </a:tc>
+              </a:tr>
+              <a:tr h="0">
+                <a:tc>
+                  <a:txBody>
+                    <a:bodyPr/>
+                    <a:lstStyle/>
+                    <a:p>
+                      <a:pPr lvl="0" indent="0" marL="0" algn="r">
+                        <a:buNone/>
+                      </a:pPr>
+                      <a:r>
+                        <a:rPr/>
+                        <a:t>6</a:t>
+                      </a:r>
+                    </a:p>
+                  </a:txBody>
+                </a:tc>
+                <a:tc>
+                  <a:txBody>
+                    <a:bodyPr/>
+                    <a:lstStyle/>
+                    <a:p>
+                      <a:pPr lvl="0" indent="0" marL="0" algn="l">
+                        <a:buNone/>
+                      </a:pPr>
+                      <a:r>
+                        <a:rPr/>
+                        <a:t>aggravated</a:t>
+                      </a:r>
+                    </a:p>
+                  </a:txBody>
+                </a:tc>
+                <a:tc>
+                  <a:txBody>
+                    <a:bodyPr/>
+                    <a:lstStyle/>
+                    <a:p>
+                      <a:pPr lvl="0" indent="0" marL="0" algn="r">
+                        <a:buNone/>
+                      </a:pPr>
+                      <a:r>
+                        <a:rPr/>
+                        <a:t>14</a:t>
+                      </a:r>
+                    </a:p>
+                  </a:txBody>
+                </a:tc>
+                <a:tc>
+                  <a:txBody>
+                    <a:bodyPr/>
+                    <a:lstStyle/>
+                    <a:p>
+                      <a:pPr lvl="0" indent="0" marL="0" algn="l">
+                        <a:buNone/>
+                      </a:pPr>
+                      <a:r>
+                        <a:rPr/>
+                        <a:t>time_sentenced_prior</a:t>
+                      </a:r>
+                    </a:p>
+                  </a:txBody>
+                </a:tc>
+              </a:tr>
+              <a:tr h="0">
+                <a:tc>
+                  <a:txBody>
+                    <a:bodyPr/>
+                    <a:lstStyle/>
+                    <a:p>
+                      <a:pPr lvl="0" indent="0" marL="0" algn="r">
+                        <a:buNone/>
+                      </a:pPr>
+                      <a:r>
+                        <a:rPr/>
+                        <a:t>7</a:t>
+                      </a:r>
+                    </a:p>
+                  </a:txBody>
+                </a:tc>
+                <a:tc>
+                  <a:txBody>
+                    <a:bodyPr/>
+                    <a:lstStyle/>
+                    <a:p>
+                      <a:pPr lvl="0" indent="0" marL="0" algn="l">
+                        <a:buNone/>
+                      </a:pPr>
+                      <a:r>
+                        <a:rPr/>
+                        <a:t>appx_age</a:t>
+                      </a:r>
+                    </a:p>
+                  </a:txBody>
+                </a:tc>
+                <a:tc>
+                  <a:txBody>
+                    <a:bodyPr/>
+                    <a:lstStyle/>
+                    <a:p>
+                      <a:pPr lvl="0" indent="0" marL="0" algn="r">
+                        <a:buNone/>
+                      </a:pPr>
+                      <a:r>
+                        <a:rPr/>
+                        <a:t>15</a:t>
+                      </a:r>
+                    </a:p>
+                  </a:txBody>
+                </a:tc>
+                <a:tc>
+                  <a:txBody>
+                    <a:bodyPr/>
+                    <a:lstStyle/>
+                    <a:p>
+                      <a:pPr lvl="0" indent="0" marL="0" algn="l">
+                        <a:buNone/>
+                      </a:pPr>
+                      <a:r>
+                        <a:rPr/>
+                        <a:t>hair</a:t>
+                      </a:r>
+                    </a:p>
+                  </a:txBody>
+                </a:tc>
+              </a:tr>
+              <a:tr h="0">
+                <a:tc>
+                  <a:txBody>
+                    <a:bodyPr/>
+                    <a:lstStyle/>
+                    <a:p>
+                      <a:pPr lvl="0" indent="0" marL="0" algn="r">
+                        <a:buNone/>
+                      </a:pPr>
+                      <a:r>
+                        <a:rPr/>
+                        <a:t>8</a:t>
+                      </a:r>
+                    </a:p>
+                  </a:txBody>
+                </a:tc>
+                <a:tc>
+                  <a:txBody>
+                    <a:bodyPr/>
+                    <a:lstStyle/>
+                    <a:p>
+                      <a:pPr lvl="0" indent="0" marL="0" algn="l">
+                        <a:buNone/>
+                      </a:pPr>
+                      <a:r>
+                        <a:rPr/>
+                        <a:t>eyes</a:t>
+                      </a:r>
+                    </a:p>
+                  </a:txBody>
+                </a:tc>
+                <a:tc>
+                  <a:txBody>
+                    <a:bodyPr/>
+                    <a:lstStyle/>
+                    <a:p>
+                      <a:pPr lvl="0" indent="0" marL="0" algn="r">
+                        <a:buNone/>
+                      </a:pPr>
+                      <a:r>
+                        <a:rPr/>
+                        <a:t>16</a:t>
+                      </a:r>
+                    </a:p>
+                  </a:txBody>
+                </a:tc>
+                <a:tc>
+                  <a:txBody>
+                    <a:bodyPr/>
+                    <a:lstStyle/>
+                    <a:p>
+                      <a:pPr lvl="0" indent="0" marL="0" algn="l">
+                        <a:buNone/>
+                      </a:pPr>
+                      <a:r>
+                        <a:rPr/>
+                        <a:t>num_tattoos</a:t>
+                      </a:r>
+                    </a:p>
+                  </a:txBody>
+                </a:tc>
+              </a:tr>
+            </a:tbl>
+          </a:graphicData>
+        </a:graphic>
+      </p:graphicFrame>
+      <p:pic>
+        <p:nvPicPr>
+          <p:cNvPr descr="HopeSlides_files/figure-pptx/unnamed-chunk-4-1.png" id="0" name="Picture 1"/>
+          <p:cNvPicPr>
+            <a:picLocks noGrp="1" noChangeAspect="1"/>
+          </p:cNvPicPr>
+          <p:nvPr/>
+        </p:nvPicPr>
+        <p:blipFill>
+          <a:blip r:embed="rId2"/>
+          <a:stretch>
+            <a:fillRect/>
+          </a:stretch>
+        </p:blipFill>
+        <p:spPr bwMode="auto">
+          <a:xfrm>
+            <a:off x="4648200" y="1879600"/>
+            <a:ext cx="4038600" cy="2019300"/>
+          </a:xfrm>
+          <a:prstGeom prst="rect">
+            <a:avLst/>
+          </a:prstGeom>
+          <a:noFill/>
+          <a:ln w="9525">
+            <a:noFill/>
+            <a:headEnd/>
+            <a:tailEnd/>
+          </a:ln>
+        </p:spPr>
+      </p:pic>
     </p:spTree>
   </p:cSld>
 </p:sld>

</xml_diff>